<commit_message>
added Final Project Documentation
</commit_message>
<xml_diff>
--- a/Data Encoders Presentation Slides.pptx
+++ b/Data Encoders Presentation Slides.pptx
@@ -111,6 +111,11 @@
       </a:defRPr>
     </a:lvl9pPr>
   </p:defaultTextStyle>
+  <p:extLst>
+    <p:ext uri="{EFAFB233-063F-42B5-8137-9DF3F51BA10A}">
+      <p15:sldGuideLst xmlns:p15="http://schemas.microsoft.com/office/powerpoint/2012/main"/>
+    </p:ext>
+  </p:extLst>
 </p:presentation>
 </file>
 
@@ -156,10 +161,9 @@
           </a:lstStyle>
           <a:p>
             <a:r>
-              <a:rPr lang="en-US" smtClean="0"/>
+              <a:rPr lang="en-US"/>
               <a:t>Click to edit Master title style</a:t>
             </a:r>
-            <a:endParaRPr lang="en-US"/>
           </a:p>
         </p:txBody>
       </p:sp>
@@ -221,10 +225,9 @@
           </a:lstStyle>
           <a:p>
             <a:r>
-              <a:rPr lang="en-US" smtClean="0"/>
+              <a:rPr lang="en-US"/>
               <a:t>Click to edit Master subtitle style</a:t>
             </a:r>
-            <a:endParaRPr lang="en-US"/>
           </a:p>
         </p:txBody>
       </p:sp>
@@ -339,10 +342,9 @@
           <a:lstStyle/>
           <a:p>
             <a:r>
-              <a:rPr lang="en-US" smtClean="0"/>
+              <a:rPr lang="en-US"/>
               <a:t>Click to edit Master title style</a:t>
             </a:r>
-            <a:endParaRPr lang="en-US"/>
           </a:p>
         </p:txBody>
       </p:sp>
@@ -363,38 +365,37 @@
           <a:p>
             <a:pPr lvl="0"/>
             <a:r>
-              <a:rPr lang="en-US" smtClean="0"/>
+              <a:rPr lang="en-US"/>
               <a:t>Edit Master text styles</a:t>
             </a:r>
           </a:p>
           <a:p>
             <a:pPr lvl="1"/>
             <a:r>
-              <a:rPr lang="en-US" smtClean="0"/>
+              <a:rPr lang="en-US"/>
               <a:t>Second level</a:t>
             </a:r>
           </a:p>
           <a:p>
             <a:pPr lvl="2"/>
             <a:r>
-              <a:rPr lang="en-US" smtClean="0"/>
+              <a:rPr lang="en-US"/>
               <a:t>Third level</a:t>
             </a:r>
           </a:p>
           <a:p>
             <a:pPr lvl="3"/>
             <a:r>
-              <a:rPr lang="en-US" smtClean="0"/>
+              <a:rPr lang="en-US"/>
               <a:t>Fourth level</a:t>
             </a:r>
           </a:p>
           <a:p>
             <a:pPr lvl="4"/>
             <a:r>
-              <a:rPr lang="en-US" smtClean="0"/>
+              <a:rPr lang="en-US"/>
               <a:t>Fifth level</a:t>
             </a:r>
-            <a:endParaRPr lang="en-US"/>
           </a:p>
         </p:txBody>
       </p:sp>
@@ -514,10 +515,9 @@
           <a:lstStyle/>
           <a:p>
             <a:r>
-              <a:rPr lang="en-US" smtClean="0"/>
+              <a:rPr lang="en-US"/>
               <a:t>Click to edit Master title style</a:t>
             </a:r>
-            <a:endParaRPr lang="en-US"/>
           </a:p>
         </p:txBody>
       </p:sp>
@@ -543,38 +543,37 @@
           <a:p>
             <a:pPr lvl="0"/>
             <a:r>
-              <a:rPr lang="en-US" smtClean="0"/>
+              <a:rPr lang="en-US"/>
               <a:t>Edit Master text styles</a:t>
             </a:r>
           </a:p>
           <a:p>
             <a:pPr lvl="1"/>
             <a:r>
-              <a:rPr lang="en-US" smtClean="0"/>
+              <a:rPr lang="en-US"/>
               <a:t>Second level</a:t>
             </a:r>
           </a:p>
           <a:p>
             <a:pPr lvl="2"/>
             <a:r>
-              <a:rPr lang="en-US" smtClean="0"/>
+              <a:rPr lang="en-US"/>
               <a:t>Third level</a:t>
             </a:r>
           </a:p>
           <a:p>
             <a:pPr lvl="3"/>
             <a:r>
-              <a:rPr lang="en-US" smtClean="0"/>
+              <a:rPr lang="en-US"/>
               <a:t>Fourth level</a:t>
             </a:r>
           </a:p>
           <a:p>
             <a:pPr lvl="4"/>
             <a:r>
-              <a:rPr lang="en-US" smtClean="0"/>
+              <a:rPr lang="en-US"/>
               <a:t>Fifth level</a:t>
             </a:r>
-            <a:endParaRPr lang="en-US"/>
           </a:p>
         </p:txBody>
       </p:sp>
@@ -2628,10 +2627,9 @@
           <a:lstStyle/>
           <a:p>
             <a:r>
-              <a:rPr lang="en-US" smtClean="0"/>
+              <a:rPr lang="en-US"/>
               <a:t>Click to edit Master title style</a:t>
             </a:r>
-            <a:endParaRPr lang="en-US"/>
           </a:p>
         </p:txBody>
       </p:sp>
@@ -2652,38 +2650,37 @@
           <a:p>
             <a:pPr lvl="0"/>
             <a:r>
-              <a:rPr lang="en-US" smtClean="0"/>
+              <a:rPr lang="en-US"/>
               <a:t>Edit Master text styles</a:t>
             </a:r>
           </a:p>
           <a:p>
             <a:pPr lvl="1"/>
             <a:r>
-              <a:rPr lang="en-US" smtClean="0"/>
+              <a:rPr lang="en-US"/>
               <a:t>Second level</a:t>
             </a:r>
           </a:p>
           <a:p>
             <a:pPr lvl="2"/>
             <a:r>
-              <a:rPr lang="en-US" smtClean="0"/>
+              <a:rPr lang="en-US"/>
               <a:t>Third level</a:t>
             </a:r>
           </a:p>
           <a:p>
             <a:pPr lvl="3"/>
             <a:r>
-              <a:rPr lang="en-US" smtClean="0"/>
+              <a:rPr lang="en-US"/>
               <a:t>Fourth level</a:t>
             </a:r>
           </a:p>
           <a:p>
             <a:pPr lvl="4"/>
             <a:r>
-              <a:rPr lang="en-US" smtClean="0"/>
+              <a:rPr lang="en-US"/>
               <a:t>Fifth level</a:t>
             </a:r>
-            <a:endParaRPr lang="en-US"/>
           </a:p>
         </p:txBody>
       </p:sp>
@@ -3503,10 +3500,9 @@
           </a:lstStyle>
           <a:p>
             <a:r>
-              <a:rPr lang="en-US" smtClean="0"/>
+              <a:rPr lang="en-US"/>
               <a:t>Click to edit Master title style</a:t>
             </a:r>
-            <a:endParaRPr lang="en-US"/>
           </a:p>
         </p:txBody>
       </p:sp>
@@ -3568,10 +3564,9 @@
           </a:lstStyle>
           <a:p>
             <a:r>
-              <a:rPr lang="en-US" smtClean="0"/>
+              <a:rPr lang="en-US"/>
               <a:t>Click to edit Master subtitle style</a:t>
             </a:r>
-            <a:endParaRPr lang="en-US"/>
           </a:p>
         </p:txBody>
       </p:sp>
@@ -3686,10 +3681,9 @@
           <a:lstStyle/>
           <a:p>
             <a:r>
-              <a:rPr lang="en-US" smtClean="0"/>
+              <a:rPr lang="en-US"/>
               <a:t>Click to edit Master title style</a:t>
             </a:r>
-            <a:endParaRPr lang="en-US"/>
           </a:p>
         </p:txBody>
       </p:sp>
@@ -3710,38 +3704,37 @@
           <a:p>
             <a:pPr lvl="0"/>
             <a:r>
-              <a:rPr lang="en-US" smtClean="0"/>
+              <a:rPr lang="en-US"/>
               <a:t>Edit Master text styles</a:t>
             </a:r>
           </a:p>
           <a:p>
             <a:pPr lvl="1"/>
             <a:r>
-              <a:rPr lang="en-US" smtClean="0"/>
+              <a:rPr lang="en-US"/>
               <a:t>Second level</a:t>
             </a:r>
           </a:p>
           <a:p>
             <a:pPr lvl="2"/>
             <a:r>
-              <a:rPr lang="en-US" smtClean="0"/>
+              <a:rPr lang="en-US"/>
               <a:t>Third level</a:t>
             </a:r>
           </a:p>
           <a:p>
             <a:pPr lvl="3"/>
             <a:r>
-              <a:rPr lang="en-US" smtClean="0"/>
+              <a:rPr lang="en-US"/>
               <a:t>Fourth level</a:t>
             </a:r>
           </a:p>
           <a:p>
             <a:pPr lvl="4"/>
             <a:r>
-              <a:rPr lang="en-US" smtClean="0"/>
+              <a:rPr lang="en-US"/>
               <a:t>Fifth level</a:t>
             </a:r>
-            <a:endParaRPr lang="en-US"/>
           </a:p>
         </p:txBody>
       </p:sp>
@@ -3866,10 +3859,9 @@
           </a:lstStyle>
           <a:p>
             <a:r>
-              <a:rPr lang="en-US" smtClean="0"/>
+              <a:rPr lang="en-US"/>
               <a:t>Click to edit Master title style</a:t>
             </a:r>
-            <a:endParaRPr lang="en-US"/>
           </a:p>
         </p:txBody>
       </p:sp>
@@ -3986,7 +3978,7 @@
           <a:p>
             <a:pPr lvl="0"/>
             <a:r>
-              <a:rPr lang="en-US" smtClean="0"/>
+              <a:rPr lang="en-US"/>
               <a:t>Edit Master text styles</a:t>
             </a:r>
           </a:p>
@@ -4103,10 +4095,9 @@
           <a:lstStyle/>
           <a:p>
             <a:r>
-              <a:rPr lang="en-US" smtClean="0"/>
+              <a:rPr lang="en-US"/>
               <a:t>Click to edit Master title style</a:t>
             </a:r>
-            <a:endParaRPr lang="en-US"/>
           </a:p>
         </p:txBody>
       </p:sp>
@@ -4132,38 +4123,37 @@
           <a:p>
             <a:pPr lvl="0"/>
             <a:r>
-              <a:rPr lang="en-US" smtClean="0"/>
+              <a:rPr lang="en-US"/>
               <a:t>Edit Master text styles</a:t>
             </a:r>
           </a:p>
           <a:p>
             <a:pPr lvl="1"/>
             <a:r>
-              <a:rPr lang="en-US" smtClean="0"/>
+              <a:rPr lang="en-US"/>
               <a:t>Second level</a:t>
             </a:r>
           </a:p>
           <a:p>
             <a:pPr lvl="2"/>
             <a:r>
-              <a:rPr lang="en-US" smtClean="0"/>
+              <a:rPr lang="en-US"/>
               <a:t>Third level</a:t>
             </a:r>
           </a:p>
           <a:p>
             <a:pPr lvl="3"/>
             <a:r>
-              <a:rPr lang="en-US" smtClean="0"/>
+              <a:rPr lang="en-US"/>
               <a:t>Fourth level</a:t>
             </a:r>
           </a:p>
           <a:p>
             <a:pPr lvl="4"/>
             <a:r>
-              <a:rPr lang="en-US" smtClean="0"/>
+              <a:rPr lang="en-US"/>
               <a:t>Fifth level</a:t>
             </a:r>
-            <a:endParaRPr lang="en-US"/>
           </a:p>
         </p:txBody>
       </p:sp>
@@ -4189,38 +4179,37 @@
           <a:p>
             <a:pPr lvl="0"/>
             <a:r>
-              <a:rPr lang="en-US" smtClean="0"/>
+              <a:rPr lang="en-US"/>
               <a:t>Edit Master text styles</a:t>
             </a:r>
           </a:p>
           <a:p>
             <a:pPr lvl="1"/>
             <a:r>
-              <a:rPr lang="en-US" smtClean="0"/>
+              <a:rPr lang="en-US"/>
               <a:t>Second level</a:t>
             </a:r>
           </a:p>
           <a:p>
             <a:pPr lvl="2"/>
             <a:r>
-              <a:rPr lang="en-US" smtClean="0"/>
+              <a:rPr lang="en-US"/>
               <a:t>Third level</a:t>
             </a:r>
           </a:p>
           <a:p>
             <a:pPr lvl="3"/>
             <a:r>
-              <a:rPr lang="en-US" smtClean="0"/>
+              <a:rPr lang="en-US"/>
               <a:t>Fourth level</a:t>
             </a:r>
           </a:p>
           <a:p>
             <a:pPr lvl="4"/>
             <a:r>
-              <a:rPr lang="en-US" smtClean="0"/>
+              <a:rPr lang="en-US"/>
               <a:t>Fifth level</a:t>
             </a:r>
-            <a:endParaRPr lang="en-US"/>
           </a:p>
         </p:txBody>
       </p:sp>
@@ -4341,10 +4330,9 @@
           <a:lstStyle/>
           <a:p>
             <a:r>
-              <a:rPr lang="en-US" smtClean="0"/>
+              <a:rPr lang="en-US"/>
               <a:t>Click to edit Master title style</a:t>
             </a:r>
-            <a:endParaRPr lang="en-US"/>
           </a:p>
         </p:txBody>
       </p:sp>
@@ -4407,7 +4395,7 @@
           <a:p>
             <a:pPr lvl="0"/>
             <a:r>
-              <a:rPr lang="en-US" smtClean="0"/>
+              <a:rPr lang="en-US"/>
               <a:t>Edit Master text styles</a:t>
             </a:r>
           </a:p>
@@ -4435,38 +4423,37 @@
           <a:p>
             <a:pPr lvl="0"/>
             <a:r>
-              <a:rPr lang="en-US" smtClean="0"/>
+              <a:rPr lang="en-US"/>
               <a:t>Edit Master text styles</a:t>
             </a:r>
           </a:p>
           <a:p>
             <a:pPr lvl="1"/>
             <a:r>
-              <a:rPr lang="en-US" smtClean="0"/>
+              <a:rPr lang="en-US"/>
               <a:t>Second level</a:t>
             </a:r>
           </a:p>
           <a:p>
             <a:pPr lvl="2"/>
             <a:r>
-              <a:rPr lang="en-US" smtClean="0"/>
+              <a:rPr lang="en-US"/>
               <a:t>Third level</a:t>
             </a:r>
           </a:p>
           <a:p>
             <a:pPr lvl="3"/>
             <a:r>
-              <a:rPr lang="en-US" smtClean="0"/>
+              <a:rPr lang="en-US"/>
               <a:t>Fourth level</a:t>
             </a:r>
           </a:p>
           <a:p>
             <a:pPr lvl="4"/>
             <a:r>
-              <a:rPr lang="en-US" smtClean="0"/>
+              <a:rPr lang="en-US"/>
               <a:t>Fifth level</a:t>
             </a:r>
-            <a:endParaRPr lang="en-US"/>
           </a:p>
         </p:txBody>
       </p:sp>
@@ -4529,7 +4516,7 @@
           <a:p>
             <a:pPr lvl="0"/>
             <a:r>
-              <a:rPr lang="en-US" smtClean="0"/>
+              <a:rPr lang="en-US"/>
               <a:t>Edit Master text styles</a:t>
             </a:r>
           </a:p>
@@ -4557,38 +4544,37 @@
           <a:p>
             <a:pPr lvl="0"/>
             <a:r>
-              <a:rPr lang="en-US" smtClean="0"/>
+              <a:rPr lang="en-US"/>
               <a:t>Edit Master text styles</a:t>
             </a:r>
           </a:p>
           <a:p>
             <a:pPr lvl="1"/>
             <a:r>
-              <a:rPr lang="en-US" smtClean="0"/>
+              <a:rPr lang="en-US"/>
               <a:t>Second level</a:t>
             </a:r>
           </a:p>
           <a:p>
             <a:pPr lvl="2"/>
             <a:r>
-              <a:rPr lang="en-US" smtClean="0"/>
+              <a:rPr lang="en-US"/>
               <a:t>Third level</a:t>
             </a:r>
           </a:p>
           <a:p>
             <a:pPr lvl="3"/>
             <a:r>
-              <a:rPr lang="en-US" smtClean="0"/>
+              <a:rPr lang="en-US"/>
               <a:t>Fourth level</a:t>
             </a:r>
           </a:p>
           <a:p>
             <a:pPr lvl="4"/>
             <a:r>
-              <a:rPr lang="en-US" smtClean="0"/>
+              <a:rPr lang="en-US"/>
               <a:t>Fifth level</a:t>
             </a:r>
-            <a:endParaRPr lang="en-US"/>
           </a:p>
         </p:txBody>
       </p:sp>
@@ -4704,10 +4690,9 @@
           <a:lstStyle/>
           <a:p>
             <a:r>
-              <a:rPr lang="en-US" smtClean="0"/>
+              <a:rPr lang="en-US"/>
               <a:t>Click to edit Master title style</a:t>
             </a:r>
-            <a:endParaRPr lang="en-US"/>
           </a:p>
         </p:txBody>
       </p:sp>
@@ -4926,10 +4911,9 @@
           </a:lstStyle>
           <a:p>
             <a:r>
-              <a:rPr lang="en-US" smtClean="0"/>
+              <a:rPr lang="en-US"/>
               <a:t>Click to edit Master title style</a:t>
             </a:r>
-            <a:endParaRPr lang="en-US"/>
           </a:p>
         </p:txBody>
       </p:sp>
@@ -5046,7 +5030,7 @@
           <a:p>
             <a:pPr lvl="0"/>
             <a:r>
-              <a:rPr lang="en-US" smtClean="0"/>
+              <a:rPr lang="en-US"/>
               <a:t>Edit Master text styles</a:t>
             </a:r>
           </a:p>
@@ -5172,10 +5156,9 @@
           </a:lstStyle>
           <a:p>
             <a:r>
-              <a:rPr lang="en-US" smtClean="0"/>
+              <a:rPr lang="en-US"/>
               <a:t>Click to edit Master title style</a:t>
             </a:r>
-            <a:endParaRPr lang="en-US"/>
           </a:p>
         </p:txBody>
       </p:sp>
@@ -5229,38 +5212,37 @@
           <a:p>
             <a:pPr lvl="0"/>
             <a:r>
-              <a:rPr lang="en-US" smtClean="0"/>
+              <a:rPr lang="en-US"/>
               <a:t>Edit Master text styles</a:t>
             </a:r>
           </a:p>
           <a:p>
             <a:pPr lvl="1"/>
             <a:r>
-              <a:rPr lang="en-US" smtClean="0"/>
+              <a:rPr lang="en-US"/>
               <a:t>Second level</a:t>
             </a:r>
           </a:p>
           <a:p>
             <a:pPr lvl="2"/>
             <a:r>
-              <a:rPr lang="en-US" smtClean="0"/>
+              <a:rPr lang="en-US"/>
               <a:t>Third level</a:t>
             </a:r>
           </a:p>
           <a:p>
             <a:pPr lvl="3"/>
             <a:r>
-              <a:rPr lang="en-US" smtClean="0"/>
+              <a:rPr lang="en-US"/>
               <a:t>Fourth level</a:t>
             </a:r>
           </a:p>
           <a:p>
             <a:pPr lvl="4"/>
             <a:r>
-              <a:rPr lang="en-US" smtClean="0"/>
+              <a:rPr lang="en-US"/>
               <a:t>Fifth level</a:t>
             </a:r>
-            <a:endParaRPr lang="en-US"/>
           </a:p>
         </p:txBody>
       </p:sp>
@@ -5323,7 +5305,7 @@
           <a:p>
             <a:pPr lvl="0"/>
             <a:r>
-              <a:rPr lang="en-US" smtClean="0"/>
+              <a:rPr lang="en-US"/>
               <a:t>Edit Master text styles</a:t>
             </a:r>
           </a:p>
@@ -5450,10 +5432,9 @@
           </a:lstStyle>
           <a:p>
             <a:r>
-              <a:rPr lang="en-US" smtClean="0"/>
+              <a:rPr lang="en-US"/>
               <a:t>Click to edit Master title style</a:t>
             </a:r>
-            <a:endParaRPr lang="en-US"/>
           </a:p>
         </p:txBody>
       </p:sp>
@@ -5577,7 +5558,7 @@
           <a:p>
             <a:pPr lvl="0"/>
             <a:r>
-              <a:rPr lang="en-US" smtClean="0"/>
+              <a:rPr lang="en-US"/>
               <a:t>Edit Master text styles</a:t>
             </a:r>
           </a:p>
@@ -5694,10 +5675,9 @@
           <a:lstStyle/>
           <a:p>
             <a:r>
-              <a:rPr lang="en-US" smtClean="0"/>
+              <a:rPr lang="en-US"/>
               <a:t>Click to edit Master title style</a:t>
             </a:r>
-            <a:endParaRPr lang="en-US"/>
           </a:p>
         </p:txBody>
       </p:sp>
@@ -5718,38 +5698,37 @@
           <a:p>
             <a:pPr lvl="0"/>
             <a:r>
-              <a:rPr lang="en-US" smtClean="0"/>
+              <a:rPr lang="en-US"/>
               <a:t>Edit Master text styles</a:t>
             </a:r>
           </a:p>
           <a:p>
             <a:pPr lvl="1"/>
             <a:r>
-              <a:rPr lang="en-US" smtClean="0"/>
+              <a:rPr lang="en-US"/>
               <a:t>Second level</a:t>
             </a:r>
           </a:p>
           <a:p>
             <a:pPr lvl="2"/>
             <a:r>
-              <a:rPr lang="en-US" smtClean="0"/>
+              <a:rPr lang="en-US"/>
               <a:t>Third level</a:t>
             </a:r>
           </a:p>
           <a:p>
             <a:pPr lvl="3"/>
             <a:r>
-              <a:rPr lang="en-US" smtClean="0"/>
+              <a:rPr lang="en-US"/>
               <a:t>Fourth level</a:t>
             </a:r>
           </a:p>
           <a:p>
             <a:pPr lvl="4"/>
             <a:r>
-              <a:rPr lang="en-US" smtClean="0"/>
+              <a:rPr lang="en-US"/>
               <a:t>Fifth level</a:t>
             </a:r>
-            <a:endParaRPr lang="en-US"/>
           </a:p>
         </p:txBody>
       </p:sp>
@@ -5870,10 +5849,9 @@
           <a:lstStyle/>
           <a:p>
             <a:r>
-              <a:rPr lang="en-US" smtClean="0"/>
+              <a:rPr lang="en-US"/>
               <a:t>Click to edit Master title style</a:t>
             </a:r>
-            <a:endParaRPr lang="en-US"/>
           </a:p>
         </p:txBody>
       </p:sp>
@@ -5899,38 +5877,37 @@
           <a:p>
             <a:pPr lvl="0"/>
             <a:r>
-              <a:rPr lang="en-US" smtClean="0"/>
+              <a:rPr lang="en-US"/>
               <a:t>Edit Master text styles</a:t>
             </a:r>
           </a:p>
           <a:p>
             <a:pPr lvl="1"/>
             <a:r>
-              <a:rPr lang="en-US" smtClean="0"/>
+              <a:rPr lang="en-US"/>
               <a:t>Second level</a:t>
             </a:r>
           </a:p>
           <a:p>
             <a:pPr lvl="2"/>
             <a:r>
-              <a:rPr lang="en-US" smtClean="0"/>
+              <a:rPr lang="en-US"/>
               <a:t>Third level</a:t>
             </a:r>
           </a:p>
           <a:p>
             <a:pPr lvl="3"/>
             <a:r>
-              <a:rPr lang="en-US" smtClean="0"/>
+              <a:rPr lang="en-US"/>
               <a:t>Fourth level</a:t>
             </a:r>
           </a:p>
           <a:p>
             <a:pPr lvl="4"/>
             <a:r>
-              <a:rPr lang="en-US" smtClean="0"/>
+              <a:rPr lang="en-US"/>
               <a:t>Fifth level</a:t>
             </a:r>
-            <a:endParaRPr lang="en-US"/>
           </a:p>
         </p:txBody>
       </p:sp>
@@ -7591,10 +7568,9 @@
           <a:lstStyle/>
           <a:p>
             <a:r>
-              <a:rPr lang="en-US" smtClean="0"/>
+              <a:rPr lang="en-US"/>
               <a:t>Click to edit Master title style</a:t>
             </a:r>
-            <a:endParaRPr lang="en-US"/>
           </a:p>
         </p:txBody>
       </p:sp>
@@ -7620,38 +7596,37 @@
           <a:p>
             <a:pPr lvl="0"/>
             <a:r>
-              <a:rPr lang="en-US" smtClean="0"/>
+              <a:rPr lang="en-US"/>
               <a:t>Edit Master text styles</a:t>
             </a:r>
           </a:p>
           <a:p>
             <a:pPr lvl="1"/>
             <a:r>
-              <a:rPr lang="en-US" smtClean="0"/>
+              <a:rPr lang="en-US"/>
               <a:t>Second level</a:t>
             </a:r>
           </a:p>
           <a:p>
             <a:pPr lvl="2"/>
             <a:r>
-              <a:rPr lang="en-US" smtClean="0"/>
+              <a:rPr lang="en-US"/>
               <a:t>Third level</a:t>
             </a:r>
           </a:p>
           <a:p>
             <a:pPr lvl="3"/>
             <a:r>
-              <a:rPr lang="en-US" smtClean="0"/>
+              <a:rPr lang="en-US"/>
               <a:t>Fourth level</a:t>
             </a:r>
           </a:p>
           <a:p>
             <a:pPr lvl="4"/>
             <a:r>
-              <a:rPr lang="en-US" smtClean="0"/>
+              <a:rPr lang="en-US"/>
               <a:t>Fifth level</a:t>
             </a:r>
-            <a:endParaRPr lang="en-US"/>
           </a:p>
         </p:txBody>
       </p:sp>
@@ -7677,38 +7652,37 @@
           <a:p>
             <a:pPr lvl="0"/>
             <a:r>
-              <a:rPr lang="en-US" smtClean="0"/>
+              <a:rPr lang="en-US"/>
               <a:t>Edit Master text styles</a:t>
             </a:r>
           </a:p>
           <a:p>
             <a:pPr lvl="1"/>
             <a:r>
-              <a:rPr lang="en-US" smtClean="0"/>
+              <a:rPr lang="en-US"/>
               <a:t>Second level</a:t>
             </a:r>
           </a:p>
           <a:p>
             <a:pPr lvl="2"/>
             <a:r>
-              <a:rPr lang="en-US" smtClean="0"/>
+              <a:rPr lang="en-US"/>
               <a:t>Third level</a:t>
             </a:r>
           </a:p>
           <a:p>
             <a:pPr lvl="3"/>
             <a:r>
-              <a:rPr lang="en-US" smtClean="0"/>
+              <a:rPr lang="en-US"/>
               <a:t>Fourth level</a:t>
             </a:r>
           </a:p>
           <a:p>
             <a:pPr lvl="4"/>
             <a:r>
-              <a:rPr lang="en-US" smtClean="0"/>
+              <a:rPr lang="en-US"/>
               <a:t>Fifth level</a:t>
             </a:r>
-            <a:endParaRPr lang="en-US"/>
           </a:p>
         </p:txBody>
       </p:sp>
@@ -9087,10 +9061,9 @@
           <a:lstStyle/>
           <a:p>
             <a:r>
-              <a:rPr lang="en-US" smtClean="0"/>
+              <a:rPr lang="en-US"/>
               <a:t>Click to edit Master title style</a:t>
             </a:r>
-            <a:endParaRPr lang="en-US"/>
           </a:p>
         </p:txBody>
       </p:sp>
@@ -9153,7 +9126,7 @@
           <a:p>
             <a:pPr lvl="0"/>
             <a:r>
-              <a:rPr lang="en-US" smtClean="0"/>
+              <a:rPr lang="en-US"/>
               <a:t>Edit Master text styles</a:t>
             </a:r>
           </a:p>
@@ -9181,38 +9154,37 @@
           <a:p>
             <a:pPr lvl="0"/>
             <a:r>
-              <a:rPr lang="en-US" smtClean="0"/>
+              <a:rPr lang="en-US"/>
               <a:t>Edit Master text styles</a:t>
             </a:r>
           </a:p>
           <a:p>
             <a:pPr lvl="1"/>
             <a:r>
-              <a:rPr lang="en-US" smtClean="0"/>
+              <a:rPr lang="en-US"/>
               <a:t>Second level</a:t>
             </a:r>
           </a:p>
           <a:p>
             <a:pPr lvl="2"/>
             <a:r>
-              <a:rPr lang="en-US" smtClean="0"/>
+              <a:rPr lang="en-US"/>
               <a:t>Third level</a:t>
             </a:r>
           </a:p>
           <a:p>
             <a:pPr lvl="3"/>
             <a:r>
-              <a:rPr lang="en-US" smtClean="0"/>
+              <a:rPr lang="en-US"/>
               <a:t>Fourth level</a:t>
             </a:r>
           </a:p>
           <a:p>
             <a:pPr lvl="4"/>
             <a:r>
-              <a:rPr lang="en-US" smtClean="0"/>
+              <a:rPr lang="en-US"/>
               <a:t>Fifth level</a:t>
             </a:r>
-            <a:endParaRPr lang="en-US"/>
           </a:p>
         </p:txBody>
       </p:sp>
@@ -9275,7 +9247,7 @@
           <a:p>
             <a:pPr lvl="0"/>
             <a:r>
-              <a:rPr lang="en-US" smtClean="0"/>
+              <a:rPr lang="en-US"/>
               <a:t>Edit Master text styles</a:t>
             </a:r>
           </a:p>
@@ -9303,38 +9275,37 @@
           <a:p>
             <a:pPr lvl="0"/>
             <a:r>
-              <a:rPr lang="en-US" smtClean="0"/>
+              <a:rPr lang="en-US"/>
               <a:t>Edit Master text styles</a:t>
             </a:r>
           </a:p>
           <a:p>
             <a:pPr lvl="1"/>
             <a:r>
-              <a:rPr lang="en-US" smtClean="0"/>
+              <a:rPr lang="en-US"/>
               <a:t>Second level</a:t>
             </a:r>
           </a:p>
           <a:p>
             <a:pPr lvl="2"/>
             <a:r>
-              <a:rPr lang="en-US" smtClean="0"/>
+              <a:rPr lang="en-US"/>
               <a:t>Third level</a:t>
             </a:r>
           </a:p>
           <a:p>
             <a:pPr lvl="3"/>
             <a:r>
-              <a:rPr lang="en-US" smtClean="0"/>
+              <a:rPr lang="en-US"/>
               <a:t>Fourth level</a:t>
             </a:r>
           </a:p>
           <a:p>
             <a:pPr lvl="4"/>
             <a:r>
-              <a:rPr lang="en-US" smtClean="0"/>
+              <a:rPr lang="en-US"/>
               <a:t>Fifth level</a:t>
             </a:r>
-            <a:endParaRPr lang="en-US"/>
           </a:p>
         </p:txBody>
       </p:sp>
@@ -9449,10 +9420,9 @@
           <a:lstStyle/>
           <a:p>
             <a:r>
-              <a:rPr lang="en-US" smtClean="0"/>
+              <a:rPr lang="en-US"/>
               <a:t>Click to edit Master title style</a:t>
             </a:r>
-            <a:endParaRPr lang="en-US"/>
           </a:p>
         </p:txBody>
       </p:sp>
@@ -9671,10 +9641,9 @@
           </a:lstStyle>
           <a:p>
             <a:r>
-              <a:rPr lang="en-US" smtClean="0"/>
+              <a:rPr lang="en-US"/>
               <a:t>Click to edit Master title style</a:t>
             </a:r>
-            <a:endParaRPr lang="en-US"/>
           </a:p>
         </p:txBody>
       </p:sp>
@@ -9728,38 +9697,37 @@
           <a:p>
             <a:pPr lvl="0"/>
             <a:r>
-              <a:rPr lang="en-US" smtClean="0"/>
+              <a:rPr lang="en-US"/>
               <a:t>Edit Master text styles</a:t>
             </a:r>
           </a:p>
           <a:p>
             <a:pPr lvl="1"/>
             <a:r>
-              <a:rPr lang="en-US" smtClean="0"/>
+              <a:rPr lang="en-US"/>
               <a:t>Second level</a:t>
             </a:r>
           </a:p>
           <a:p>
             <a:pPr lvl="2"/>
             <a:r>
-              <a:rPr lang="en-US" smtClean="0"/>
+              <a:rPr lang="en-US"/>
               <a:t>Third level</a:t>
             </a:r>
           </a:p>
           <a:p>
             <a:pPr lvl="3"/>
             <a:r>
-              <a:rPr lang="en-US" smtClean="0"/>
+              <a:rPr lang="en-US"/>
               <a:t>Fourth level</a:t>
             </a:r>
           </a:p>
           <a:p>
             <a:pPr lvl="4"/>
             <a:r>
-              <a:rPr lang="en-US" smtClean="0"/>
+              <a:rPr lang="en-US"/>
               <a:t>Fifth level</a:t>
             </a:r>
-            <a:endParaRPr lang="en-US"/>
           </a:p>
         </p:txBody>
       </p:sp>
@@ -9822,7 +9790,7 @@
           <a:p>
             <a:pPr lvl="0"/>
             <a:r>
-              <a:rPr lang="en-US" smtClean="0"/>
+              <a:rPr lang="en-US"/>
               <a:t>Edit Master text styles</a:t>
             </a:r>
           </a:p>
@@ -9948,10 +9916,9 @@
           </a:lstStyle>
           <a:p>
             <a:r>
-              <a:rPr lang="en-US" smtClean="0"/>
+              <a:rPr lang="en-US"/>
               <a:t>Click to edit Master title style</a:t>
             </a:r>
-            <a:endParaRPr lang="en-US"/>
           </a:p>
         </p:txBody>
       </p:sp>
@@ -10075,7 +10042,7 @@
           <a:p>
             <a:pPr lvl="0"/>
             <a:r>
-              <a:rPr lang="en-US" smtClean="0"/>
+              <a:rPr lang="en-US"/>
               <a:t>Edit Master text styles</a:t>
             </a:r>
           </a:p>
@@ -10207,10 +10174,9 @@
           <a:lstStyle/>
           <a:p>
             <a:r>
-              <a:rPr lang="en-US" smtClean="0"/>
+              <a:rPr lang="en-US"/>
               <a:t>Click to edit Master title style</a:t>
             </a:r>
-            <a:endParaRPr lang="en-US"/>
           </a:p>
         </p:txBody>
       </p:sp>
@@ -10241,38 +10207,37 @@
           <a:p>
             <a:pPr lvl="0"/>
             <a:r>
-              <a:rPr lang="en-US" smtClean="0"/>
+              <a:rPr lang="en-US"/>
               <a:t>Edit Master text styles</a:t>
             </a:r>
           </a:p>
           <a:p>
             <a:pPr lvl="1"/>
             <a:r>
-              <a:rPr lang="en-US" smtClean="0"/>
+              <a:rPr lang="en-US"/>
               <a:t>Second level</a:t>
             </a:r>
           </a:p>
           <a:p>
             <a:pPr lvl="2"/>
             <a:r>
-              <a:rPr lang="en-US" smtClean="0"/>
+              <a:rPr lang="en-US"/>
               <a:t>Third level</a:t>
             </a:r>
           </a:p>
           <a:p>
             <a:pPr lvl="3"/>
             <a:r>
-              <a:rPr lang="en-US" smtClean="0"/>
+              <a:rPr lang="en-US"/>
               <a:t>Fourth level</a:t>
             </a:r>
           </a:p>
           <a:p>
             <a:pPr lvl="4"/>
             <a:r>
-              <a:rPr lang="en-US" smtClean="0"/>
+              <a:rPr lang="en-US"/>
               <a:t>Fifth level</a:t>
             </a:r>
-            <a:endParaRPr lang="en-US"/>
           </a:p>
         </p:txBody>
       </p:sp>
@@ -11316,10 +11281,9 @@
           <a:lstStyle/>
           <a:p>
             <a:r>
-              <a:rPr lang="en-US" smtClean="0"/>
+              <a:rPr lang="en-US"/>
               <a:t>Click to edit Master title style</a:t>
             </a:r>
-            <a:endParaRPr lang="en-US"/>
           </a:p>
         </p:txBody>
       </p:sp>
@@ -11350,38 +11314,37 @@
           <a:p>
             <a:pPr lvl="0"/>
             <a:r>
-              <a:rPr lang="en-US" smtClean="0"/>
+              <a:rPr lang="en-US"/>
               <a:t>Edit Master text styles</a:t>
             </a:r>
           </a:p>
           <a:p>
             <a:pPr lvl="1"/>
             <a:r>
-              <a:rPr lang="en-US" smtClean="0"/>
+              <a:rPr lang="en-US"/>
               <a:t>Second level</a:t>
             </a:r>
           </a:p>
           <a:p>
             <a:pPr lvl="2"/>
             <a:r>
-              <a:rPr lang="en-US" smtClean="0"/>
+              <a:rPr lang="en-US"/>
               <a:t>Third level</a:t>
             </a:r>
           </a:p>
           <a:p>
             <a:pPr lvl="3"/>
             <a:r>
-              <a:rPr lang="en-US" smtClean="0"/>
+              <a:rPr lang="en-US"/>
               <a:t>Fourth level</a:t>
             </a:r>
           </a:p>
           <a:p>
             <a:pPr lvl="4"/>
             <a:r>
-              <a:rPr lang="en-US" smtClean="0"/>
+              <a:rPr lang="en-US"/>
               <a:t>Fifth level</a:t>
             </a:r>
-            <a:endParaRPr lang="en-US"/>
           </a:p>
         </p:txBody>
       </p:sp>
@@ -12676,41 +12639,30 @@
           <a:p>
             <a:pPr lvl="0"/>
             <a:r>
-              <a:rPr lang="en-US" b="1" dirty="0" smtClean="0">
+              <a:rPr lang="en-US" b="1" dirty="0">
                 <a:latin typeface="Times New Roman" panose="02020603050405020304" pitchFamily="18" charset="0"/>
                 <a:cs typeface="Times New Roman" panose="02020603050405020304" pitchFamily="18" charset="0"/>
               </a:rPr>
               <a:t>Step 1: </a:t>
             </a:r>
             <a:r>
-              <a:rPr lang="en-US" dirty="0" smtClean="0">
+              <a:rPr lang="en-US" dirty="0">
                 <a:latin typeface="Times New Roman" panose="02020603050405020304" pitchFamily="18" charset="0"/>
                 <a:cs typeface="Times New Roman" panose="02020603050405020304" pitchFamily="18" charset="0"/>
               </a:rPr>
-              <a:t>Download Vader Lexicon from NLTK Package and import Sentiment Intensity </a:t>
-            </a:r>
-            <a:r>
-              <a:rPr lang="en-US" dirty="0" smtClean="0">
-                <a:latin typeface="Times New Roman" panose="02020603050405020304" pitchFamily="18" charset="0"/>
-                <a:cs typeface="Times New Roman" panose="02020603050405020304" pitchFamily="18" charset="0"/>
-              </a:rPr>
-              <a:t>Analyzer</a:t>
-            </a:r>
-            <a:endParaRPr lang="en-US" dirty="0">
-              <a:latin typeface="Times New Roman" panose="02020603050405020304" pitchFamily="18" charset="0"/>
-              <a:cs typeface="Times New Roman" panose="02020603050405020304" pitchFamily="18" charset="0"/>
-            </a:endParaRPr>
-          </a:p>
-          <a:p>
-            <a:r>
-              <a:rPr lang="en-US" b="1" dirty="0" smtClean="0">
+              <a:t>Download Vader Lexicon from NLTK Package and import Sentiment Intensity Analyzer</a:t>
+            </a:r>
+          </a:p>
+          <a:p>
+            <a:r>
+              <a:rPr lang="en-US" b="1" dirty="0">
                 <a:latin typeface="Times New Roman" panose="02020603050405020304" pitchFamily="18" charset="0"/>
                 <a:cs typeface="Times New Roman" panose="02020603050405020304" pitchFamily="18" charset="0"/>
               </a:rPr>
               <a:t>Step 2: </a:t>
             </a:r>
             <a:r>
-              <a:rPr lang="en-US" dirty="0" smtClean="0">
+              <a:rPr lang="en-US" dirty="0">
                 <a:latin typeface="Times New Roman" panose="02020603050405020304" pitchFamily="18" charset="0"/>
                 <a:cs typeface="Times New Roman" panose="02020603050405020304" pitchFamily="18" charset="0"/>
               </a:rPr>
@@ -12728,53 +12680,32 @@
                 <a:latin typeface="Times New Roman" panose="02020603050405020304" pitchFamily="18" charset="0"/>
                 <a:cs typeface="Times New Roman" panose="02020603050405020304" pitchFamily="18" charset="0"/>
               </a:rPr>
-              <a:t> </a:t>
-            </a:r>
-            <a:r>
-              <a:rPr lang="en-US" dirty="0" smtClean="0">
+              <a:t>  package and cleaning the data using regular expression. </a:t>
+            </a:r>
+          </a:p>
+          <a:p>
+            <a:r>
+              <a:rPr lang="en-US" b="1" dirty="0">
                 <a:latin typeface="Times New Roman" panose="02020603050405020304" pitchFamily="18" charset="0"/>
                 <a:cs typeface="Times New Roman" panose="02020603050405020304" pitchFamily="18" charset="0"/>
               </a:rPr>
-              <a:t> package and </a:t>
+              <a:t>Step 3: </a:t>
             </a:r>
             <a:r>
               <a:rPr lang="en-US" dirty="0">
                 <a:latin typeface="Times New Roman" panose="02020603050405020304" pitchFamily="18" charset="0"/>
                 <a:cs typeface="Times New Roman" panose="02020603050405020304" pitchFamily="18" charset="0"/>
               </a:rPr>
-              <a:t>c</a:t>
-            </a:r>
-            <a:r>
-              <a:rPr lang="en-US" dirty="0" smtClean="0">
-                <a:latin typeface="Times New Roman" panose="02020603050405020304" pitchFamily="18" charset="0"/>
-                <a:cs typeface="Times New Roman" panose="02020603050405020304" pitchFamily="18" charset="0"/>
-              </a:rPr>
-              <a:t>leaning the data using regular expression. </a:t>
-            </a:r>
-          </a:p>
-          <a:p>
-            <a:r>
-              <a:rPr lang="en-US" b="1" dirty="0" smtClean="0">
-                <a:latin typeface="Times New Roman" panose="02020603050405020304" pitchFamily="18" charset="0"/>
-                <a:cs typeface="Times New Roman" panose="02020603050405020304" pitchFamily="18" charset="0"/>
-              </a:rPr>
-              <a:t>Step 3: </a:t>
-            </a:r>
-            <a:r>
-              <a:rPr lang="en-US" dirty="0" smtClean="0">
-                <a:latin typeface="Times New Roman" panose="02020603050405020304" pitchFamily="18" charset="0"/>
-                <a:cs typeface="Times New Roman" panose="02020603050405020304" pitchFamily="18" charset="0"/>
-              </a:rPr>
               <a:t>The sentiment Analysis will be done based on the number of the positive and negative words in given the text or sentence(commentary).</a:t>
             </a:r>
-            <a:endParaRPr lang="en-US" b="1" dirty="0" smtClean="0">
+            <a:endParaRPr lang="en-US" b="1" dirty="0">
               <a:latin typeface="Times New Roman" panose="02020603050405020304" pitchFamily="18" charset="0"/>
               <a:cs typeface="Times New Roman" panose="02020603050405020304" pitchFamily="18" charset="0"/>
             </a:endParaRPr>
           </a:p>
           <a:p>
             <a:r>
-              <a:rPr lang="en-US" b="1" dirty="0" smtClean="0">
+              <a:rPr lang="en-US" b="1" dirty="0">
                 <a:latin typeface="Times New Roman" panose="02020603050405020304" pitchFamily="18" charset="0"/>
                 <a:cs typeface="Times New Roman" panose="02020603050405020304" pitchFamily="18" charset="0"/>
               </a:rPr>
@@ -12785,14 +12716,7 @@
                 <a:latin typeface="Times New Roman" panose="02020603050405020304" pitchFamily="18" charset="0"/>
                 <a:cs typeface="Times New Roman" panose="02020603050405020304" pitchFamily="18" charset="0"/>
               </a:rPr>
-              <a:t>B</a:t>
-            </a:r>
-            <a:r>
-              <a:rPr lang="en-US" dirty="0" smtClean="0">
-                <a:latin typeface="Times New Roman" panose="02020603050405020304" pitchFamily="18" charset="0"/>
-                <a:cs typeface="Times New Roman" panose="02020603050405020304" pitchFamily="18" charset="0"/>
-              </a:rPr>
-              <a:t>ased on polarity scores.( i.e., positive or negative). The emoji’s will be generated.</a:t>
+              <a:t>Based on polarity scores.( i.e., positive or negative). The emoji’s will be generated.</a:t>
             </a:r>
           </a:p>
         </p:txBody>
@@ -12843,10 +12767,9 @@
           <a:lstStyle/>
           <a:p>
             <a:r>
-              <a:rPr lang="en-US" b="1" dirty="0" smtClean="0"/>
+              <a:rPr lang="en-US" b="1" dirty="0"/>
               <a:t>ODBC Connection</a:t>
             </a:r>
-            <a:endParaRPr lang="en-US" b="1" dirty="0"/>
           </a:p>
         </p:txBody>
       </p:sp>
@@ -12876,7 +12799,7 @@
               <a:buNone/>
             </a:pPr>
             <a:r>
-              <a:rPr lang="en-US" dirty="0" smtClean="0"/>
+              <a:rPr lang="en-US" dirty="0"/>
               <a:t>We need to make sure that mongoDB is running before we are connecting it to PowerBI and then we can follow the below steps</a:t>
             </a:r>
           </a:p>
@@ -12886,17 +12809,13 @@
             </a:pPr>
             <a:r>
               <a:rPr lang="en-US" b="1" dirty="0"/>
-              <a:t>Step 1 : Adding a </a:t>
-            </a:r>
-            <a:r>
-              <a:rPr lang="en-US" b="1" dirty="0" smtClean="0"/>
-              <a:t>DSN</a:t>
-            </a:r>
-            <a:endParaRPr lang="en-US" dirty="0" smtClean="0"/>
-          </a:p>
-          <a:p>
-            <a:r>
-              <a:rPr lang="en-US" dirty="0" smtClean="0"/>
+              <a:t>Step 1 : Adding a DSN</a:t>
+            </a:r>
+            <a:endParaRPr lang="en-US" dirty="0"/>
+          </a:p>
+          <a:p>
+            <a:r>
+              <a:rPr lang="en-US" dirty="0"/>
               <a:t>We need to select ODBC Administrator and we need to Add DSN by filling all the appropriate details such as Data source Name , user credentials, Server name.</a:t>
             </a:r>
           </a:p>
@@ -12905,25 +12824,16 @@
               <a:buNone/>
             </a:pPr>
             <a:r>
-              <a:rPr lang="en-US" b="1" dirty="0" smtClean="0"/>
-              <a:t>Step </a:t>
-            </a:r>
-            <a:r>
               <a:rPr lang="en-US" b="1" dirty="0"/>
-              <a:t>2</a:t>
-            </a:r>
-            <a:r>
-              <a:rPr lang="en-US" b="1" dirty="0" smtClean="0"/>
-              <a:t>: Fetching data into PowerBI</a:t>
-            </a:r>
-            <a:endParaRPr lang="en-US" dirty="0" smtClean="0"/>
-          </a:p>
-          <a:p>
-            <a:r>
-              <a:rPr lang="en-US" dirty="0" smtClean="0"/>
+              <a:t>Step 2: Fetching data into PowerBI</a:t>
+            </a:r>
+            <a:endParaRPr lang="en-US" dirty="0"/>
+          </a:p>
+          <a:p>
+            <a:r>
+              <a:rPr lang="en-US" dirty="0"/>
               <a:t>Now we can go to PowerBI and get data by connecting the DSN which we created earlier in order to fetch all the tables present in the database.</a:t>
             </a:r>
-            <a:endParaRPr lang="en-US" dirty="0"/>
           </a:p>
         </p:txBody>
       </p:sp>
@@ -12980,7 +12890,7 @@
           <a:p>
             <a:r>
               <a:rPr lang="en-US" dirty="0"/>
-              <a:t>Data Transformations</a:t>
+              <a:t>Data Curation</a:t>
             </a:r>
           </a:p>
         </p:txBody>
@@ -13171,16 +13081,12 @@
           <a:lstStyle/>
           <a:p>
             <a:r>
-              <a:rPr lang="en-US" sz="3200" b="1" dirty="0" smtClean="0">
+              <a:rPr lang="en-US" sz="3200" b="1" dirty="0">
                 <a:latin typeface="Times New Roman" panose="02020603050405020304" pitchFamily="18" charset="0"/>
                 <a:cs typeface="Times New Roman" panose="02020603050405020304" pitchFamily="18" charset="0"/>
               </a:rPr>
               <a:t>Streaming Analytics</a:t>
             </a:r>
-            <a:endParaRPr lang="en-US" sz="3200" b="1" dirty="0">
-              <a:latin typeface="Times New Roman" panose="02020603050405020304" pitchFamily="18" charset="0"/>
-              <a:cs typeface="Times New Roman" panose="02020603050405020304" pitchFamily="18" charset="0"/>
-            </a:endParaRPr>
           </a:p>
         </p:txBody>
       </p:sp>
@@ -13200,14 +13106,14 @@
           <a:lstStyle/>
           <a:p>
             <a:r>
-              <a:rPr lang="en-US" b="1" dirty="0" smtClean="0">
+              <a:rPr lang="en-US" b="1" dirty="0">
                 <a:latin typeface="Times New Roman" panose="02020603050405020304" pitchFamily="18" charset="0"/>
                 <a:cs typeface="Times New Roman" panose="02020603050405020304" pitchFamily="18" charset="0"/>
               </a:rPr>
               <a:t>Step 1 </a:t>
             </a:r>
             <a:r>
-              <a:rPr lang="en-US" dirty="0" smtClean="0">
+              <a:rPr lang="en-US" dirty="0">
                 <a:latin typeface="Times New Roman" panose="02020603050405020304" pitchFamily="18" charset="0"/>
                 <a:cs typeface="Times New Roman" panose="02020603050405020304" pitchFamily="18" charset="0"/>
               </a:rPr>
@@ -13216,14 +13122,14 @@
           </a:p>
           <a:p>
             <a:r>
-              <a:rPr lang="en-US" b="1" dirty="0" smtClean="0">
+              <a:rPr lang="en-US" b="1" dirty="0">
                 <a:latin typeface="Times New Roman" panose="02020603050405020304" pitchFamily="18" charset="0"/>
                 <a:cs typeface="Times New Roman" panose="02020603050405020304" pitchFamily="18" charset="0"/>
               </a:rPr>
               <a:t>Step 2</a:t>
             </a:r>
             <a:r>
-              <a:rPr lang="en-US" dirty="0" smtClean="0">
+              <a:rPr lang="en-US" dirty="0">
                 <a:latin typeface="Times New Roman" panose="02020603050405020304" pitchFamily="18" charset="0"/>
                 <a:cs typeface="Times New Roman" panose="02020603050405020304" pitchFamily="18" charset="0"/>
               </a:rPr>
@@ -13232,34 +13138,30 @@
           </a:p>
           <a:p>
             <a:r>
-              <a:rPr lang="en-US" b="1" dirty="0" smtClean="0">
+              <a:rPr lang="en-US" b="1" dirty="0">
                 <a:latin typeface="Times New Roman" panose="02020603050405020304" pitchFamily="18" charset="0"/>
                 <a:cs typeface="Times New Roman" panose="02020603050405020304" pitchFamily="18" charset="0"/>
               </a:rPr>
               <a:t>Step 3</a:t>
             </a:r>
             <a:r>
-              <a:rPr lang="en-US" dirty="0" smtClean="0">
+              <a:rPr lang="en-US" dirty="0">
                 <a:latin typeface="Times New Roman" panose="02020603050405020304" pitchFamily="18" charset="0"/>
                 <a:cs typeface="Times New Roman" panose="02020603050405020304" pitchFamily="18" charset="0"/>
               </a:rPr>
               <a:t>:- Drag the columns of both team innings scores into values </a:t>
             </a:r>
-            <a:endParaRPr lang="en-US" dirty="0">
-              <a:latin typeface="Times New Roman" panose="02020603050405020304" pitchFamily="18" charset="0"/>
-              <a:cs typeface="Times New Roman" panose="02020603050405020304" pitchFamily="18" charset="0"/>
-            </a:endParaRPr>
-          </a:p>
-          <a:p>
-            <a:r>
-              <a:rPr lang="en-US" b="1" dirty="0" smtClean="0">
+          </a:p>
+          <a:p>
+            <a:r>
+              <a:rPr lang="en-US" b="1" dirty="0">
                 <a:latin typeface="Times New Roman" panose="02020603050405020304" pitchFamily="18" charset="0"/>
                 <a:cs typeface="Times New Roman" panose="02020603050405020304" pitchFamily="18" charset="0"/>
               </a:rPr>
               <a:t>Step 4</a:t>
             </a:r>
             <a:r>
-              <a:rPr lang="en-US" dirty="0" smtClean="0">
+              <a:rPr lang="en-US" dirty="0">
                 <a:latin typeface="Times New Roman" panose="02020603050405020304" pitchFamily="18" charset="0"/>
                 <a:cs typeface="Times New Roman" panose="02020603050405020304" pitchFamily="18" charset="0"/>
               </a:rPr>
@@ -13268,23 +13170,19 @@
           </a:p>
           <a:p>
             <a:r>
-              <a:rPr lang="en-US" b="1" dirty="0" smtClean="0">
+              <a:rPr lang="en-US" b="1" dirty="0">
                 <a:latin typeface="Times New Roman" panose="02020603050405020304" pitchFamily="18" charset="0"/>
                 <a:cs typeface="Times New Roman" panose="02020603050405020304" pitchFamily="18" charset="0"/>
               </a:rPr>
               <a:t>Step 5</a:t>
             </a:r>
             <a:r>
-              <a:rPr lang="en-US" dirty="0" smtClean="0">
+              <a:rPr lang="en-US" dirty="0">
                 <a:latin typeface="Times New Roman" panose="02020603050405020304" pitchFamily="18" charset="0"/>
                 <a:cs typeface="Times New Roman" panose="02020603050405020304" pitchFamily="18" charset="0"/>
               </a:rPr>
               <a:t>:- Change the Color of the bars to respective ones</a:t>
             </a:r>
-            <a:endParaRPr lang="en-US" dirty="0">
-              <a:latin typeface="Times New Roman" panose="02020603050405020304" pitchFamily="18" charset="0"/>
-              <a:cs typeface="Times New Roman" panose="02020603050405020304" pitchFamily="18" charset="0"/>
-            </a:endParaRPr>
           </a:p>
         </p:txBody>
       </p:sp>

</xml_diff>